<commit_message>
New PPT and PPTX files for Chapter 12
</commit_message>
<xml_diff>
--- a/Chapter12/Presentation.pptx
+++ b/Chapter12/Presentation.pptx
@@ -210,7 +210,7 @@
           <a:p>
             <a:fld id="{92CA3644-27CC-46A3-BA99-6C115A547C95}" type="datetimeFigureOut">
               <a:rPr lang="en-US" smtClean="0"/>
-              <a:t>11/25/18</a:t>
+              <a:t>1/16/19</a:t>
             </a:fld>
             <a:endParaRPr lang="en-US"/>
           </a:p>
@@ -628,17 +628,6 @@
             </a:endParaRPr>
           </a:p>
           <a:p>
-            <a:endParaRPr lang="en-US" sz="1200" kern="1200" dirty="0">
-              <a:solidFill>
-                <a:schemeClr val="tx1"/>
-              </a:solidFill>
-              <a:effectLst/>
-              <a:latin typeface="+mn-lt"/>
-              <a:ea typeface="+mn-ea"/>
-              <a:cs typeface="+mn-cs"/>
-            </a:endParaRPr>
-          </a:p>
-          <a:p>
             <a:r>
               <a:rPr lang="en-GB" sz="1200" kern="1200" dirty="0">
                 <a:solidFill>
@@ -1105,7 +1094,7 @@
             <a:fld id="{B61BEF0D-F0BB-DE4B-95CE-6DB70DBA9567}" type="datetimeFigureOut">
               <a:rPr lang="en-US" dirty="0"/>
               <a:pPr/>
-              <a:t>11/25/18</a:t>
+              <a:t>1/16/19</a:t>
             </a:fld>
             <a:endParaRPr lang="en-US" dirty="0"/>
           </a:p>
@@ -1364,7 +1353,7 @@
             <a:fld id="{B61BEF0D-F0BB-DE4B-95CE-6DB70DBA9567}" type="datetimeFigureOut">
               <a:rPr lang="en-US" dirty="0"/>
               <a:pPr/>
-              <a:t>11/25/18</a:t>
+              <a:t>1/16/19</a:t>
             </a:fld>
             <a:endParaRPr lang="en-US" dirty="0"/>
           </a:p>
@@ -1596,7 +1585,7 @@
             <a:fld id="{B61BEF0D-F0BB-DE4B-95CE-6DB70DBA9567}" type="datetimeFigureOut">
               <a:rPr lang="en-US" dirty="0"/>
               <a:pPr/>
-              <a:t>11/25/18</a:t>
+              <a:t>1/16/19</a:t>
             </a:fld>
             <a:endParaRPr lang="en-US" dirty="0"/>
           </a:p>
@@ -1833,7 +1822,7 @@
             <a:fld id="{B61BEF0D-F0BB-DE4B-95CE-6DB70DBA9567}" type="datetimeFigureOut">
               <a:rPr lang="en-US" dirty="0"/>
               <a:pPr/>
-              <a:t>11/25/18</a:t>
+              <a:t>1/16/19</a:t>
             </a:fld>
             <a:endParaRPr lang="en-US" dirty="0"/>
           </a:p>
@@ -2137,7 +2126,7 @@
             <a:fld id="{B61BEF0D-F0BB-DE4B-95CE-6DB70DBA9567}" type="datetimeFigureOut">
               <a:rPr lang="en-US" dirty="0"/>
               <a:pPr/>
-              <a:t>11/25/18</a:t>
+              <a:t>1/16/19</a:t>
             </a:fld>
             <a:endParaRPr lang="en-US" dirty="0"/>
           </a:p>
@@ -2436,7 +2425,7 @@
             <a:fld id="{B61BEF0D-F0BB-DE4B-95CE-6DB70DBA9567}" type="datetimeFigureOut">
               <a:rPr lang="en-US" dirty="0"/>
               <a:pPr/>
-              <a:t>11/25/18</a:t>
+              <a:t>1/16/19</a:t>
             </a:fld>
             <a:endParaRPr lang="en-US" dirty="0"/>
           </a:p>
@@ -2855,7 +2844,7 @@
             <a:fld id="{B61BEF0D-F0BB-DE4B-95CE-6DB70DBA9567}" type="datetimeFigureOut">
               <a:rPr lang="en-US" dirty="0"/>
               <a:pPr/>
-              <a:t>11/25/18</a:t>
+              <a:t>1/16/19</a:t>
             </a:fld>
             <a:endParaRPr lang="en-US" dirty="0"/>
           </a:p>
@@ -3014,7 +3003,7 @@
             <a:fld id="{B61BEF0D-F0BB-DE4B-95CE-6DB70DBA9567}" type="datetimeFigureOut">
               <a:rPr lang="en-US" dirty="0"/>
               <a:pPr/>
-              <a:t>11/25/18</a:t>
+              <a:t>1/16/19</a:t>
             </a:fld>
             <a:endParaRPr lang="en-US" dirty="0"/>
           </a:p>
@@ -3106,7 +3095,7 @@
             <a:fld id="{B61BEF0D-F0BB-DE4B-95CE-6DB70DBA9567}" type="datetimeFigureOut">
               <a:rPr lang="en-US" dirty="0"/>
               <a:pPr/>
-              <a:t>11/25/18</a:t>
+              <a:t>1/16/19</a:t>
             </a:fld>
             <a:endParaRPr lang="en-US" dirty="0"/>
           </a:p>
@@ -3481,7 +3470,7 @@
             <a:fld id="{B61BEF0D-F0BB-DE4B-95CE-6DB70DBA9567}" type="datetimeFigureOut">
               <a:rPr lang="en-US" dirty="0"/>
               <a:pPr/>
-              <a:t>11/25/18</a:t>
+              <a:t>1/16/19</a:t>
             </a:fld>
             <a:endParaRPr lang="en-US" dirty="0"/>
           </a:p>
@@ -3767,7 +3756,7 @@
             <a:fld id="{B61BEF0D-F0BB-DE4B-95CE-6DB70DBA9567}" type="datetimeFigureOut">
               <a:rPr lang="en-US" dirty="0"/>
               <a:pPr/>
-              <a:t>11/25/18</a:t>
+              <a:t>1/16/19</a:t>
             </a:fld>
             <a:endParaRPr lang="en-US" dirty="0"/>
           </a:p>
@@ -3975,7 +3964,7 @@
             <a:fld id="{B61BEF0D-F0BB-DE4B-95CE-6DB70DBA9567}" type="datetimeFigureOut">
               <a:rPr lang="en-US" dirty="0"/>
               <a:pPr/>
-              <a:t>11/25/18</a:t>
+              <a:t>1/16/19</a:t>
             </a:fld>
             <a:endParaRPr lang="en-US" dirty="0"/>
           </a:p>

</xml_diff>